<commit_message>
finished writing esp32 firmware
</commit_message>
<xml_diff>
--- a/Figures.pptx
+++ b/Figures.pptx
@@ -6,6 +6,9 @@
   </p:sldMasterIdLst>
   <p:sldIdLst>
     <p:sldId id="256" r:id="rId2"/>
+    <p:sldId id="257" r:id="rId3"/>
+    <p:sldId id="258" r:id="rId4"/>
+    <p:sldId id="259" r:id="rId5"/>
   </p:sldIdLst>
   <p:sldSz cx="12192000" cy="6858000"/>
   <p:notesSz cx="6858000" cy="9144000"/>
@@ -4015,6 +4018,558 @@
 </p:sld>
 </file>
 
+<file path=ppt/slides/slide2.xml><?xml version="1.0" encoding="utf-8"?>
+<p:sld xmlns:a="http://schemas.openxmlformats.org/drawingml/2006/main" xmlns:r="http://schemas.openxmlformats.org/officeDocument/2006/relationships" xmlns:p="http://schemas.openxmlformats.org/presentationml/2006/main">
+  <p:cSld>
+    <p:spTree>
+      <p:nvGrpSpPr>
+        <p:cNvPr id="1" name=""/>
+        <p:cNvGrpSpPr/>
+        <p:nvPr/>
+      </p:nvGrpSpPr>
+      <p:grpSpPr>
+        <a:xfrm>
+          <a:off x="0" y="0"/>
+          <a:ext cx="0" cy="0"/>
+          <a:chOff x="0" y="0"/>
+          <a:chExt cx="0" cy="0"/>
+        </a:xfrm>
+      </p:grpSpPr>
+      <p:pic>
+        <p:nvPicPr>
+          <p:cNvPr id="11" name="Picture 10" descr="A small green and black pump&#10;&#10;AI-generated content may be incorrect.">
+            <a:extLst>
+              <a:ext uri="{FF2B5EF4-FFF2-40B4-BE49-F238E27FC236}">
+                <a16:creationId xmlns:a16="http://schemas.microsoft.com/office/drawing/2014/main" id="{3DBDEF84-2C68-E217-EE63-76D30A24AFC4}"/>
+              </a:ext>
+            </a:extLst>
+          </p:cNvPr>
+          <p:cNvPicPr>
+            <a:picLocks noChangeAspect="1"/>
+          </p:cNvPicPr>
+          <p:nvPr/>
+        </p:nvPicPr>
+        <p:blipFill>
+          <a:blip r:embed="rId2">
+            <a:extLst>
+              <a:ext uri="{28A0092B-C50C-407E-A947-70E740481C1C}">
+                <a14:useLocalDpi xmlns:a14="http://schemas.microsoft.com/office/drawing/2010/main" val="0"/>
+              </a:ext>
+            </a:extLst>
+          </a:blip>
+          <a:stretch>
+            <a:fillRect/>
+          </a:stretch>
+        </p:blipFill>
+        <p:spPr>
+          <a:xfrm flipH="1">
+            <a:off x="5708374" y="465897"/>
+            <a:ext cx="5429250" cy="5429250"/>
+          </a:xfrm>
+          <a:prstGeom prst="rect">
+            <a:avLst/>
+          </a:prstGeom>
+        </p:spPr>
+      </p:pic>
+      <p:pic>
+        <p:nvPicPr>
+          <p:cNvPr id="7" name="Picture 6" descr="A red and white pump with wires&#10;&#10;AI-generated content may be incorrect.">
+            <a:extLst>
+              <a:ext uri="{FF2B5EF4-FFF2-40B4-BE49-F238E27FC236}">
+                <a16:creationId xmlns:a16="http://schemas.microsoft.com/office/drawing/2014/main" id="{047DD23C-CDB2-FA21-EBD3-1A586E1B71BF}"/>
+              </a:ext>
+            </a:extLst>
+          </p:cNvPr>
+          <p:cNvPicPr>
+            <a:picLocks noChangeAspect="1"/>
+          </p:cNvPicPr>
+          <p:nvPr/>
+        </p:nvPicPr>
+        <p:blipFill>
+          <a:blip r:embed="rId3">
+            <a:extLst>
+              <a:ext uri="{28A0092B-C50C-407E-A947-70E740481C1C}">
+                <a14:useLocalDpi xmlns:a14="http://schemas.microsoft.com/office/drawing/2010/main" val="0"/>
+              </a:ext>
+            </a:extLst>
+          </a:blip>
+          <a:stretch>
+            <a:fillRect/>
+          </a:stretch>
+        </p:blipFill>
+        <p:spPr>
+          <a:xfrm>
+            <a:off x="1182796" y="465897"/>
+            <a:ext cx="5429250" cy="5429250"/>
+          </a:xfrm>
+          <a:prstGeom prst="rect">
+            <a:avLst/>
+          </a:prstGeom>
+        </p:spPr>
+      </p:pic>
+      <p:sp>
+        <p:nvSpPr>
+          <p:cNvPr id="14" name="Oval 13">
+            <a:extLst>
+              <a:ext uri="{FF2B5EF4-FFF2-40B4-BE49-F238E27FC236}">
+                <a16:creationId xmlns:a16="http://schemas.microsoft.com/office/drawing/2014/main" id="{4C44DA59-096A-F643-3C89-DE8EB6C2EB96}"/>
+              </a:ext>
+            </a:extLst>
+          </p:cNvPr>
+          <p:cNvSpPr/>
+          <p:nvPr/>
+        </p:nvSpPr>
+        <p:spPr>
+          <a:xfrm>
+            <a:off x="2233676" y="789558"/>
+            <a:ext cx="540000" cy="540000"/>
+          </a:xfrm>
+          <a:prstGeom prst="ellipse">
+            <a:avLst/>
+          </a:prstGeom>
+          <a:ln w="28575">
+            <a:solidFill>
+              <a:schemeClr val="accent1"/>
+            </a:solidFill>
+          </a:ln>
+        </p:spPr>
+        <p:style>
+          <a:lnRef idx="2">
+            <a:schemeClr val="accent6"/>
+          </a:lnRef>
+          <a:fillRef idx="1">
+            <a:schemeClr val="lt1"/>
+          </a:fillRef>
+          <a:effectRef idx="0">
+            <a:schemeClr val="accent6"/>
+          </a:effectRef>
+          <a:fontRef idx="minor">
+            <a:schemeClr val="dk1"/>
+          </a:fontRef>
+        </p:style>
+        <p:txBody>
+          <a:bodyPr rtlCol="0" anchor="ctr"/>
+          <a:lstStyle/>
+          <a:p>
+            <a:pPr algn="ctr"/>
+            <a:r>
+              <a:rPr lang="en-US" sz="2400" b="1" dirty="0">
+                <a:solidFill>
+                  <a:schemeClr val="tx1"/>
+                </a:solidFill>
+              </a:rPr>
+              <a:t>1</a:t>
+            </a:r>
+            <a:endParaRPr lang="en-US" b="1" dirty="0">
+              <a:solidFill>
+                <a:schemeClr val="tx1"/>
+              </a:solidFill>
+            </a:endParaRPr>
+          </a:p>
+        </p:txBody>
+      </p:sp>
+      <p:sp>
+        <p:nvSpPr>
+          <p:cNvPr id="15" name="Oval 14">
+            <a:extLst>
+              <a:ext uri="{FF2B5EF4-FFF2-40B4-BE49-F238E27FC236}">
+                <a16:creationId xmlns:a16="http://schemas.microsoft.com/office/drawing/2014/main" id="{6B116C91-79FE-4F6B-2153-562409478931}"/>
+              </a:ext>
+            </a:extLst>
+          </p:cNvPr>
+          <p:cNvSpPr/>
+          <p:nvPr/>
+        </p:nvSpPr>
+        <p:spPr>
+          <a:xfrm>
+            <a:off x="6999436" y="789558"/>
+            <a:ext cx="540000" cy="540000"/>
+          </a:xfrm>
+          <a:prstGeom prst="ellipse">
+            <a:avLst/>
+          </a:prstGeom>
+          <a:ln w="28575">
+            <a:solidFill>
+              <a:schemeClr val="accent1"/>
+            </a:solidFill>
+          </a:ln>
+        </p:spPr>
+        <p:style>
+          <a:lnRef idx="2">
+            <a:schemeClr val="accent6"/>
+          </a:lnRef>
+          <a:fillRef idx="1">
+            <a:schemeClr val="lt1"/>
+          </a:fillRef>
+          <a:effectRef idx="0">
+            <a:schemeClr val="accent6"/>
+          </a:effectRef>
+          <a:fontRef idx="minor">
+            <a:schemeClr val="dk1"/>
+          </a:fontRef>
+        </p:style>
+        <p:txBody>
+          <a:bodyPr rtlCol="0" anchor="ctr"/>
+          <a:lstStyle/>
+          <a:p>
+            <a:pPr algn="ctr"/>
+            <a:r>
+              <a:rPr lang="en-US" sz="2400" b="1" dirty="0">
+                <a:solidFill>
+                  <a:schemeClr val="tx1"/>
+                </a:solidFill>
+              </a:rPr>
+              <a:t>2</a:t>
+            </a:r>
+            <a:endParaRPr lang="en-US" b="1" dirty="0">
+              <a:solidFill>
+                <a:schemeClr val="tx1"/>
+              </a:solidFill>
+            </a:endParaRPr>
+          </a:p>
+        </p:txBody>
+      </p:sp>
+    </p:spTree>
+    <p:extLst>
+      <p:ext uri="{BB962C8B-B14F-4D97-AF65-F5344CB8AC3E}">
+        <p14:creationId xmlns:p14="http://schemas.microsoft.com/office/powerpoint/2010/main" val="3039252888"/>
+      </p:ext>
+    </p:extLst>
+  </p:cSld>
+  <p:clrMapOvr>
+    <a:masterClrMapping/>
+  </p:clrMapOvr>
+</p:sld>
+</file>
+
+<file path=ppt/slides/slide3.xml><?xml version="1.0" encoding="utf-8"?>
+<p:sld xmlns:a="http://schemas.openxmlformats.org/drawingml/2006/main" xmlns:r="http://schemas.openxmlformats.org/officeDocument/2006/relationships" xmlns:p="http://schemas.openxmlformats.org/presentationml/2006/main">
+  <p:cSld>
+    <p:spTree>
+      <p:nvGrpSpPr>
+        <p:cNvPr id="1" name=""/>
+        <p:cNvGrpSpPr/>
+        <p:nvPr/>
+      </p:nvGrpSpPr>
+      <p:grpSpPr>
+        <a:xfrm>
+          <a:off x="0" y="0"/>
+          <a:ext cx="0" cy="0"/>
+          <a:chOff x="0" y="0"/>
+          <a:chExt cx="0" cy="0"/>
+        </a:xfrm>
+      </p:grpSpPr>
+      <p:pic>
+        <p:nvPicPr>
+          <p:cNvPr id="3" name="Picture 2" descr="A blue circuit board with a screen and a rectangular object&#10;&#10;AI-generated content may be incorrect.">
+            <a:extLst>
+              <a:ext uri="{FF2B5EF4-FFF2-40B4-BE49-F238E27FC236}">
+                <a16:creationId xmlns:a16="http://schemas.microsoft.com/office/drawing/2014/main" id="{E01C0C8D-2E40-A692-B6A4-55BD5C46EC50}"/>
+              </a:ext>
+            </a:extLst>
+          </p:cNvPr>
+          <p:cNvPicPr>
+            <a:picLocks noChangeAspect="1"/>
+          </p:cNvPicPr>
+          <p:nvPr/>
+        </p:nvPicPr>
+        <p:blipFill>
+          <a:blip r:embed="rId2">
+            <a:extLst>
+              <a:ext uri="{28A0092B-C50C-407E-A947-70E740481C1C}">
+                <a14:useLocalDpi xmlns:a14="http://schemas.microsoft.com/office/drawing/2010/main" val="0"/>
+              </a:ext>
+            </a:extLst>
+          </a:blip>
+          <a:srcRect l="838" r="39283"/>
+          <a:stretch>
+            <a:fillRect/>
+          </a:stretch>
+        </p:blipFill>
+        <p:spPr>
+          <a:xfrm>
+            <a:off x="1053547" y="339448"/>
+            <a:ext cx="5337313" cy="6179104"/>
+          </a:xfrm>
+          <a:prstGeom prst="rect">
+            <a:avLst/>
+          </a:prstGeom>
+        </p:spPr>
+      </p:pic>
+      <p:pic>
+        <p:nvPicPr>
+          <p:cNvPr id="5" name="Picture 4" descr="A circuit board with wires and wires&#10;&#10;AI-generated content may be incorrect.">
+            <a:extLst>
+              <a:ext uri="{FF2B5EF4-FFF2-40B4-BE49-F238E27FC236}">
+                <a16:creationId xmlns:a16="http://schemas.microsoft.com/office/drawing/2014/main" id="{941065FD-A6F7-F42D-118E-889DA067B580}"/>
+              </a:ext>
+            </a:extLst>
+          </p:cNvPr>
+          <p:cNvPicPr>
+            <a:picLocks noChangeAspect="1"/>
+          </p:cNvPicPr>
+          <p:nvPr/>
+        </p:nvPicPr>
+        <p:blipFill>
+          <a:blip r:embed="rId3">
+            <a:extLst>
+              <a:ext uri="{28A0092B-C50C-407E-A947-70E740481C1C}">
+                <a14:useLocalDpi xmlns:a14="http://schemas.microsoft.com/office/drawing/2010/main" val="0"/>
+              </a:ext>
+            </a:extLst>
+          </a:blip>
+          <a:srcRect l="4998" t="11872" r="14770" b="2029"/>
+          <a:stretch>
+            <a:fillRect/>
+          </a:stretch>
+        </p:blipFill>
+        <p:spPr>
+          <a:xfrm>
+            <a:off x="7401337" y="339448"/>
+            <a:ext cx="4326834" cy="6179104"/>
+          </a:xfrm>
+          <a:prstGeom prst="rect">
+            <a:avLst/>
+          </a:prstGeom>
+        </p:spPr>
+      </p:pic>
+      <p:sp>
+        <p:nvSpPr>
+          <p:cNvPr id="6" name="Oval 5">
+            <a:extLst>
+              <a:ext uri="{FF2B5EF4-FFF2-40B4-BE49-F238E27FC236}">
+                <a16:creationId xmlns:a16="http://schemas.microsoft.com/office/drawing/2014/main" id="{BBFAF98C-BA28-9086-6BBA-C772DC53D884}"/>
+              </a:ext>
+            </a:extLst>
+          </p:cNvPr>
+          <p:cNvSpPr/>
+          <p:nvPr/>
+        </p:nvSpPr>
+        <p:spPr>
+          <a:xfrm>
+            <a:off x="325375" y="342302"/>
+            <a:ext cx="540000" cy="540000"/>
+          </a:xfrm>
+          <a:prstGeom prst="ellipse">
+            <a:avLst/>
+          </a:prstGeom>
+          <a:ln w="28575">
+            <a:solidFill>
+              <a:schemeClr val="accent1"/>
+            </a:solidFill>
+          </a:ln>
+        </p:spPr>
+        <p:style>
+          <a:lnRef idx="2">
+            <a:schemeClr val="accent6"/>
+          </a:lnRef>
+          <a:fillRef idx="1">
+            <a:schemeClr val="lt1"/>
+          </a:fillRef>
+          <a:effectRef idx="0">
+            <a:schemeClr val="accent6"/>
+          </a:effectRef>
+          <a:fontRef idx="minor">
+            <a:schemeClr val="dk1"/>
+          </a:fontRef>
+        </p:style>
+        <p:txBody>
+          <a:bodyPr rtlCol="0" anchor="ctr"/>
+          <a:lstStyle/>
+          <a:p>
+            <a:pPr algn="ctr"/>
+            <a:r>
+              <a:rPr lang="en-US" sz="2400" b="1" dirty="0">
+                <a:solidFill>
+                  <a:schemeClr val="tx1"/>
+                </a:solidFill>
+              </a:rPr>
+              <a:t>1</a:t>
+            </a:r>
+            <a:endParaRPr lang="en-US" b="1" dirty="0">
+              <a:solidFill>
+                <a:schemeClr val="tx1"/>
+              </a:solidFill>
+            </a:endParaRPr>
+          </a:p>
+        </p:txBody>
+      </p:sp>
+      <p:sp>
+        <p:nvSpPr>
+          <p:cNvPr id="7" name="Oval 6">
+            <a:extLst>
+              <a:ext uri="{FF2B5EF4-FFF2-40B4-BE49-F238E27FC236}">
+                <a16:creationId xmlns:a16="http://schemas.microsoft.com/office/drawing/2014/main" id="{05D6AE5F-91C2-A9F3-572F-BE7E7146E2D2}"/>
+              </a:ext>
+            </a:extLst>
+          </p:cNvPr>
+          <p:cNvSpPr/>
+          <p:nvPr/>
+        </p:nvSpPr>
+        <p:spPr>
+          <a:xfrm>
+            <a:off x="6621757" y="342302"/>
+            <a:ext cx="540000" cy="540000"/>
+          </a:xfrm>
+          <a:prstGeom prst="ellipse">
+            <a:avLst/>
+          </a:prstGeom>
+          <a:ln w="28575">
+            <a:solidFill>
+              <a:schemeClr val="accent1"/>
+            </a:solidFill>
+          </a:ln>
+        </p:spPr>
+        <p:style>
+          <a:lnRef idx="2">
+            <a:schemeClr val="accent6"/>
+          </a:lnRef>
+          <a:fillRef idx="1">
+            <a:schemeClr val="lt1"/>
+          </a:fillRef>
+          <a:effectRef idx="0">
+            <a:schemeClr val="accent6"/>
+          </a:effectRef>
+          <a:fontRef idx="minor">
+            <a:schemeClr val="dk1"/>
+          </a:fontRef>
+        </p:style>
+        <p:txBody>
+          <a:bodyPr rtlCol="0" anchor="ctr"/>
+          <a:lstStyle/>
+          <a:p>
+            <a:pPr algn="ctr"/>
+            <a:r>
+              <a:rPr lang="en-US" sz="2400" b="1" dirty="0">
+                <a:solidFill>
+                  <a:schemeClr val="tx1"/>
+                </a:solidFill>
+              </a:rPr>
+              <a:t>2</a:t>
+            </a:r>
+            <a:endParaRPr lang="en-US" b="1" dirty="0">
+              <a:solidFill>
+                <a:schemeClr val="tx1"/>
+              </a:solidFill>
+            </a:endParaRPr>
+          </a:p>
+        </p:txBody>
+      </p:sp>
+    </p:spTree>
+    <p:extLst>
+      <p:ext uri="{BB962C8B-B14F-4D97-AF65-F5344CB8AC3E}">
+        <p14:creationId xmlns:p14="http://schemas.microsoft.com/office/powerpoint/2010/main" val="2263600649"/>
+      </p:ext>
+    </p:extLst>
+  </p:cSld>
+  <p:clrMapOvr>
+    <a:masterClrMapping/>
+  </p:clrMapOvr>
+</p:sld>
+</file>
+
+<file path=ppt/slides/slide4.xml><?xml version="1.0" encoding="utf-8"?>
+<p:sld xmlns:a="http://schemas.openxmlformats.org/drawingml/2006/main" xmlns:r="http://schemas.openxmlformats.org/officeDocument/2006/relationships" xmlns:p="http://schemas.openxmlformats.org/presentationml/2006/main">
+  <p:cSld>
+    <p:spTree>
+      <p:nvGrpSpPr>
+        <p:cNvPr id="1" name=""/>
+        <p:cNvGrpSpPr/>
+        <p:nvPr/>
+      </p:nvGrpSpPr>
+      <p:grpSpPr>
+        <a:xfrm>
+          <a:off x="0" y="0"/>
+          <a:ext cx="0" cy="0"/>
+          <a:chOff x="0" y="0"/>
+          <a:chExt cx="0" cy="0"/>
+        </a:xfrm>
+      </p:grpSpPr>
+      <p:pic>
+        <p:nvPicPr>
+          <p:cNvPr id="3" name="Picture 2" descr="A screenshot of a smart hydropor tower&#10;&#10;AI-generated content may be incorrect.">
+            <a:extLst>
+              <a:ext uri="{FF2B5EF4-FFF2-40B4-BE49-F238E27FC236}">
+                <a16:creationId xmlns:a16="http://schemas.microsoft.com/office/drawing/2014/main" id="{E504DAB8-35CB-BF98-E725-1A0B58EE41E4}"/>
+              </a:ext>
+            </a:extLst>
+          </p:cNvPr>
+          <p:cNvPicPr>
+            <a:picLocks noChangeAspect="1"/>
+          </p:cNvPicPr>
+          <p:nvPr/>
+        </p:nvPicPr>
+        <p:blipFill>
+          <a:blip r:embed="rId2">
+            <a:extLst>
+              <a:ext uri="{28A0092B-C50C-407E-A947-70E740481C1C}">
+                <a14:useLocalDpi xmlns:a14="http://schemas.microsoft.com/office/drawing/2010/main" val="0"/>
+              </a:ext>
+            </a:extLst>
+          </a:blip>
+          <a:stretch>
+            <a:fillRect/>
+          </a:stretch>
+        </p:blipFill>
+        <p:spPr>
+          <a:xfrm>
+            <a:off x="679397" y="1547283"/>
+            <a:ext cx="5323090" cy="2994238"/>
+          </a:xfrm>
+          <a:prstGeom prst="rect">
+            <a:avLst/>
+          </a:prstGeom>
+        </p:spPr>
+      </p:pic>
+      <p:pic>
+        <p:nvPicPr>
+          <p:cNvPr id="5" name="Picture 4" descr="A screenshot of a computer&#10;&#10;AI-generated content may be incorrect.">
+            <a:extLst>
+              <a:ext uri="{FF2B5EF4-FFF2-40B4-BE49-F238E27FC236}">
+                <a16:creationId xmlns:a16="http://schemas.microsoft.com/office/drawing/2014/main" id="{1C8061FA-4AEB-E424-6951-8BD9EDF504C6}"/>
+              </a:ext>
+            </a:extLst>
+          </p:cNvPr>
+          <p:cNvPicPr>
+            <a:picLocks noChangeAspect="1"/>
+          </p:cNvPicPr>
+          <p:nvPr/>
+        </p:nvPicPr>
+        <p:blipFill>
+          <a:blip r:embed="rId3">
+            <a:extLst>
+              <a:ext uri="{28A0092B-C50C-407E-A947-70E740481C1C}">
+                <a14:useLocalDpi xmlns:a14="http://schemas.microsoft.com/office/drawing/2010/main" val="0"/>
+              </a:ext>
+            </a:extLst>
+          </a:blip>
+          <a:stretch>
+            <a:fillRect/>
+          </a:stretch>
+        </p:blipFill>
+        <p:spPr>
+          <a:xfrm>
+            <a:off x="6574081" y="2836366"/>
+            <a:ext cx="5317606" cy="2994237"/>
+          </a:xfrm>
+          <a:prstGeom prst="rect">
+            <a:avLst/>
+          </a:prstGeom>
+        </p:spPr>
+      </p:pic>
+    </p:spTree>
+    <p:extLst>
+      <p:ext uri="{BB962C8B-B14F-4D97-AF65-F5344CB8AC3E}">
+        <p14:creationId xmlns:p14="http://schemas.microsoft.com/office/powerpoint/2010/main" val="959323020"/>
+      </p:ext>
+    </p:extLst>
+  </p:cSld>
+  <p:clrMapOvr>
+    <a:masterClrMapping/>
+  </p:clrMapOvr>
+</p:sld>
+</file>
+
 <file path=ppt/theme/theme1.xml><?xml version="1.0" encoding="utf-8"?>
 <a:theme xmlns:a="http://schemas.openxmlformats.org/drawingml/2006/main" name="Office Theme">
   <a:themeElements>

</xml_diff>